<commit_message>
read_table2() -> read_table() in two-way anova slides
</commit_message>
<xml_diff>
--- a/slides/07-two-way-anova.pptx
+++ b/slides/07-two-way-anova.pptx
@@ -54,22 +54,22 @@
   <p:notesSz cx="10233025" cy="7102475"/>
   <p:embeddedFontLst>
     <p:embeddedFont>
-      <p:font typeface="Lucida Console" panose="020B0609040504020204" pitchFamily="49" charset="0"/>
+      <p:font typeface="Calibri" panose="020F0502020204030204" pitchFamily="34" charset="0"/>
       <p:regular r:id="rId42"/>
+      <p:bold r:id="rId43"/>
+      <p:italic r:id="rId44"/>
+      <p:boldItalic r:id="rId45"/>
     </p:embeddedFont>
     <p:embeddedFont>
       <p:font typeface="Consolas" panose="020B0609020204030204" pitchFamily="49" charset="0"/>
-      <p:regular r:id="rId43"/>
-      <p:bold r:id="rId44"/>
-      <p:italic r:id="rId45"/>
-      <p:boldItalic r:id="rId46"/>
+      <p:regular r:id="rId46"/>
+      <p:bold r:id="rId47"/>
+      <p:italic r:id="rId48"/>
+      <p:boldItalic r:id="rId49"/>
     </p:embeddedFont>
     <p:embeddedFont>
-      <p:font typeface="Calibri" panose="020F0502020204030204" pitchFamily="34" charset="0"/>
-      <p:regular r:id="rId47"/>
-      <p:bold r:id="rId48"/>
-      <p:italic r:id="rId49"/>
-      <p:boldItalic r:id="rId50"/>
+      <p:font typeface="Lucida Console" panose="020B0609040504020204" pitchFamily="49" charset="0"/>
+      <p:regular r:id="rId50"/>
     </p:embeddedFont>
     <p:embeddedFont>
       <p:font typeface="Verdana" panose="020B0604030504040204" pitchFamily="34" charset="0"/>
@@ -194,6 +194,35 @@
     </p:ext>
   </p:extLst>
 </p:presentation>
+</file>
+
+<file path=ppt/changesInfos/changesInfo1.xml><?xml version="1.0" encoding="utf-8"?>
+<pc:chgInfo xmlns:a="http://schemas.openxmlformats.org/drawingml/2006/main" xmlns:r="http://schemas.openxmlformats.org/officeDocument/2006/relationships" xmlns:ac="http://schemas.microsoft.com/office/drawing/2013/main/command" xmlns:pc="http://schemas.microsoft.com/office/powerpoint/2013/main/command">
+  <pc:docChgLst>
+    <pc:chgData name="Emma Rand" userId="ca99d2fc-c0c8-4652-9960-8a576749f5d7" providerId="ADAL" clId="{6AA84FC8-4465-4E18-8E67-A5BC3F9412D3}"/>
+    <pc:docChg chg="modSld">
+      <pc:chgData name="Emma Rand" userId="ca99d2fc-c0c8-4652-9960-8a576749f5d7" providerId="ADAL" clId="{6AA84FC8-4465-4E18-8E67-A5BC3F9412D3}" dt="2022-02-27T12:19:04.146" v="0" actId="6549"/>
+      <pc:docMkLst>
+        <pc:docMk/>
+      </pc:docMkLst>
+      <pc:sldChg chg="modSp mod">
+        <pc:chgData name="Emma Rand" userId="ca99d2fc-c0c8-4652-9960-8a576749f5d7" providerId="ADAL" clId="{6AA84FC8-4465-4E18-8E67-A5BC3F9412D3}" dt="2022-02-27T12:19:04.146" v="0" actId="6549"/>
+        <pc:sldMkLst>
+          <pc:docMk/>
+          <pc:sldMk cId="1928266392" sldId="493"/>
+        </pc:sldMkLst>
+        <pc:spChg chg="mod">
+          <ac:chgData name="Emma Rand" userId="ca99d2fc-c0c8-4652-9960-8a576749f5d7" providerId="ADAL" clId="{6AA84FC8-4465-4E18-8E67-A5BC3F9412D3}" dt="2022-02-27T12:19:04.146" v="0" actId="6549"/>
+          <ac:spMkLst>
+            <pc:docMk/>
+            <pc:sldMk cId="1928266392" sldId="493"/>
+            <ac:spMk id="50178" creationId="{00000000-0000-0000-0000-000000000000}"/>
+          </ac:spMkLst>
+        </pc:spChg>
+      </pc:sldChg>
+    </pc:docChg>
+  </pc:docChgLst>
+</pc:chgInfo>
 </file>
 
 <file path=ppt/charts/chart1.xml><?xml version="1.0" encoding="utf-8"?>
@@ -585,7 +614,7 @@
           <a:p>
             <a:fld id="{C8B221E9-F974-4869-B9C8-E1512ECFD807}" type="datetimeFigureOut">
               <a:rPr lang="en-GB" smtClean="0"/>
-              <a:t>25/02/2021</a:t>
+              <a:t>27/02/2022</a:t>
             </a:fld>
             <a:endParaRPr lang="en-GB"/>
           </a:p>
@@ -750,7 +779,7 @@
           <a:p>
             <a:fld id="{8410BF60-2399-471B-88B8-98E5D19A2C28}" type="datetimeFigureOut">
               <a:rPr lang="en-GB" smtClean="0"/>
-              <a:t>25/02/2021</a:t>
+              <a:t>27/02/2022</a:t>
             </a:fld>
             <a:endParaRPr lang="en-GB"/>
           </a:p>
@@ -7815,7 +7844,7 @@
           <a:p>
             <a:fld id="{8D8741C9-1E1B-4FF3-A7E9-1243E9823EB4}" type="datetime1">
               <a:rPr lang="en-US" smtClean="0"/>
-              <a:t>2/25/2021</a:t>
+              <a:t>2/27/2022</a:t>
             </a:fld>
             <a:endParaRPr lang="en-US"/>
           </a:p>
@@ -7979,7 +8008,7 @@
           <a:p>
             <a:fld id="{A612FBD6-812A-4416-A980-4B9119C35DA5}" type="datetime1">
               <a:rPr lang="en-US" smtClean="0"/>
-              <a:t>2/25/2021</a:t>
+              <a:t>2/27/2022</a:t>
             </a:fld>
             <a:endParaRPr lang="en-US"/>
           </a:p>
@@ -8153,7 +8182,7 @@
           <a:p>
             <a:fld id="{36BDB8FA-BBB8-495B-B161-4F7BDFDDEDA3}" type="datetime1">
               <a:rPr lang="en-US" smtClean="0"/>
-              <a:t>2/25/2021</a:t>
+              <a:t>2/27/2022</a:t>
             </a:fld>
             <a:endParaRPr lang="en-US"/>
           </a:p>
@@ -8319,7 +8348,7 @@
           <a:p>
             <a:fld id="{E20C214B-656F-4D67-9F4A-70D59F6620AC}" type="datetime1">
               <a:rPr lang="en-US" smtClean="0"/>
-              <a:t>2/25/2021</a:t>
+              <a:t>2/27/2022</a:t>
             </a:fld>
             <a:endParaRPr lang="en-US"/>
           </a:p>
@@ -8438,7 +8467,7 @@
           <a:p>
             <a:fld id="{E20C214B-656F-4D67-9F4A-70D59F6620AC}" type="datetime1">
               <a:rPr lang="en-US" smtClean="0"/>
-              <a:t>2/25/2021</a:t>
+              <a:t>2/27/2022</a:t>
             </a:fld>
             <a:endParaRPr lang="en-US"/>
           </a:p>
@@ -8629,7 +8658,7 @@
           <a:p>
             <a:fld id="{C75385EC-3DC5-4FB3-BD46-054AE38A1DA3}" type="datetime1">
               <a:rPr lang="en-US" smtClean="0"/>
-              <a:t>2/25/2021</a:t>
+              <a:t>2/27/2022</a:t>
             </a:fld>
             <a:endParaRPr lang="en-US"/>
           </a:p>
@@ -8870,7 +8899,7 @@
           <a:p>
             <a:fld id="{2F304D26-DE6E-4F1A-B4D1-9E6E5BEF65E2}" type="datetime1">
               <a:rPr lang="en-US" smtClean="0"/>
-              <a:t>2/25/2021</a:t>
+              <a:t>2/27/2022</a:t>
             </a:fld>
             <a:endParaRPr lang="en-US"/>
           </a:p>
@@ -9151,7 +9180,7 @@
           <a:p>
             <a:fld id="{20DF7611-242A-4AB8-BF3D-8696A364C66C}" type="datetime1">
               <a:rPr lang="en-US" smtClean="0"/>
-              <a:t>2/25/2021</a:t>
+              <a:t>2/27/2022</a:t>
             </a:fld>
             <a:endParaRPr lang="en-US"/>
           </a:p>
@@ -9566,7 +9595,7 @@
           <a:p>
             <a:fld id="{DBB8C006-CEDD-4D5A-BF40-3F5AD76685BA}" type="datetime1">
               <a:rPr lang="en-US" smtClean="0"/>
-              <a:t>2/25/2021</a:t>
+              <a:t>2/27/2022</a:t>
             </a:fld>
             <a:endParaRPr lang="en-US"/>
           </a:p>
@@ -9679,7 +9708,7 @@
           <a:p>
             <a:fld id="{203F5178-2C49-4CC5-9BF1-3EA0F730AC68}" type="datetime1">
               <a:rPr lang="en-US" smtClean="0"/>
-              <a:t>2/25/2021</a:t>
+              <a:t>2/27/2022</a:t>
             </a:fld>
             <a:endParaRPr lang="en-US"/>
           </a:p>
@@ -9770,7 +9799,7 @@
           <a:p>
             <a:fld id="{CB5083F6-940C-434A-A58D-C14A68B618CE}" type="datetime1">
               <a:rPr lang="en-US" smtClean="0"/>
-              <a:t>2/25/2021</a:t>
+              <a:t>2/27/2022</a:t>
             </a:fld>
             <a:endParaRPr lang="en-US"/>
           </a:p>
@@ -10041,7 +10070,7 @@
           <a:p>
             <a:fld id="{6B69DB20-2F70-429C-8D6F-BD64D4D77F86}" type="datetime1">
               <a:rPr lang="en-US" smtClean="0"/>
-              <a:t>2/25/2021</a:t>
+              <a:t>2/27/2022</a:t>
             </a:fld>
             <a:endParaRPr lang="en-US"/>
           </a:p>
@@ -10289,7 +10318,7 @@
           <a:p>
             <a:fld id="{C1CA00C8-74D9-48C2-9E25-45761229EB05}" type="datetime1">
               <a:rPr lang="en-US" smtClean="0"/>
-              <a:t>2/25/2021</a:t>
+              <a:t>2/27/2022</a:t>
             </a:fld>
             <a:endParaRPr lang="en-US"/>
           </a:p>
@@ -10496,7 +10525,7 @@
           <a:p>
             <a:fld id="{E20C214B-656F-4D67-9F4A-70D59F6620AC}" type="datetime1">
               <a:rPr lang="en-US" smtClean="0"/>
-              <a:t>2/25/2021</a:t>
+              <a:t>2/27/2022</a:t>
             </a:fld>
             <a:endParaRPr lang="en-US"/>
           </a:p>
@@ -10995,13 +11024,6 @@
   <p:clrMapOvr>
     <a:masterClrMapping/>
   </p:clrMapOvr>
-  <p:timing>
-    <p:tnLst>
-      <p:par>
-        <p:cTn id="1" dur="indefinite" restart="never" nodeType="tmRoot"/>
-      </p:par>
-    </p:tnLst>
-  </p:timing>
 </p:sld>
 </file>
 
@@ -11062,15 +11084,7 @@
             </a:pPr>
             <a:r>
               <a:rPr lang="en-GB" altLang="en-US" dirty="0"/>
-              <a:t>Normality and </a:t>
-            </a:r>
-            <a:r>
-              <a:rPr lang="en-GB" altLang="en-US" dirty="0" smtClean="0"/>
-              <a:t>homogeneity of variance in </a:t>
-            </a:r>
-            <a:r>
-              <a:rPr lang="en-GB" altLang="en-US" dirty="0"/>
-              <a:t>residuals </a:t>
+              <a:t>Normality and homogeneity of variance in residuals </a:t>
             </a:r>
           </a:p>
           <a:p>
@@ -11192,13 +11206,6 @@
   <p:clrMapOvr>
     <a:masterClrMapping/>
   </p:clrMapOvr>
-  <p:timing>
-    <p:tnLst>
-      <p:par>
-        <p:cTn id="1" dur="indefinite" restart="never" nodeType="tmRoot"/>
-      </p:par>
-    </p:tnLst>
-  </p:timing>
 </p:sld>
 </file>
 
@@ -11236,13 +11243,8 @@
           <a:p>
             <a:r>
               <a:rPr lang="en-US" dirty="0"/>
-              <a:t>The </a:t>
-            </a:r>
-            <a:r>
-              <a:rPr lang="en-US" dirty="0" smtClean="0"/>
-              <a:t>two-way ANOVA</a:t>
-            </a:r>
-            <a:endParaRPr lang="en-US" dirty="0"/>
+              <a:t>The two-way ANOVA</a:t>
+            </a:r>
           </a:p>
         </p:txBody>
       </p:sp>
@@ -11262,10 +11264,9 @@
           <a:lstStyle/>
           <a:p>
             <a:r>
-              <a:rPr lang="en-US" dirty="0" smtClean="0"/>
+              <a:rPr lang="en-US" dirty="0"/>
               <a:t>A parametric test</a:t>
             </a:r>
-            <a:endParaRPr lang="en-US" dirty="0"/>
           </a:p>
         </p:txBody>
       </p:sp>
@@ -11303,13 +11304,6 @@
   <p:clrMapOvr>
     <a:masterClrMapping/>
   </p:clrMapOvr>
-  <p:timing>
-    <p:tnLst>
-      <p:par>
-        <p:cTn id="1" dur="indefinite" restart="never" nodeType="tmRoot"/>
-      </p:par>
-    </p:tnLst>
-  </p:timing>
 </p:sld>
 </file>
 
@@ -11505,13 +11499,6 @@
   <p:clrMapOvr>
     <a:masterClrMapping/>
   </p:clrMapOvr>
-  <p:timing>
-    <p:tnLst>
-      <p:par>
-        <p:cTn id="1" dur="indefinite" restart="never" nodeType="tmRoot"/>
-      </p:par>
-    </p:tnLst>
-  </p:timing>
 </p:sld>
 </file>
 
@@ -11766,13 +11753,6 @@
   <p:clrMapOvr>
     <a:masterClrMapping/>
   </p:clrMapOvr>
-  <p:timing>
-    <p:tnLst>
-      <p:par>
-        <p:cTn id="1" dur="indefinite" restart="never" nodeType="tmRoot"/>
-      </p:par>
-    </p:tnLst>
-  </p:timing>
 </p:sld>
 </file>
 
@@ -12073,13 +12053,6 @@
   <p:clrMapOvr>
     <a:masterClrMapping/>
   </p:clrMapOvr>
-  <p:timing>
-    <p:tnLst>
-      <p:par>
-        <p:cTn id="1" dur="indefinite" restart="never" nodeType="tmRoot"/>
-      </p:par>
-    </p:tnLst>
-  </p:timing>
 </p:sld>
 </file>
 
@@ -12137,25 +12110,28 @@
                 <a:latin typeface="Lucida Console" panose="020B0609040504020204" pitchFamily="49" charset="0"/>
                 <a:cs typeface="Courier New" pitchFamily="49" charset="0"/>
               </a:rPr>
-              <a:t>butter &lt;- </a:t>
-            </a:r>
-            <a:r>
-              <a:rPr lang="en-GB" altLang="en-US" sz="1400" dirty="0" smtClean="0">
+              <a:t>butter &lt;- read</a:t>
+            </a:r>
+            <a:r>
+              <a:rPr lang="en-GB" altLang="en-US" sz="1400">
                 <a:solidFill>
                   <a:srgbClr val="3333FF"/>
                 </a:solidFill>
                 <a:latin typeface="Lucida Console" panose="020B0609040504020204" pitchFamily="49" charset="0"/>
                 <a:cs typeface="Courier New" pitchFamily="49" charset="0"/>
               </a:rPr>
-              <a:t>read_table2(“../data/butterf.txt")</a:t>
-            </a:r>
-            <a:endParaRPr lang="en-GB" altLang="en-US" sz="1400" dirty="0">
-              <a:solidFill>
-                <a:srgbClr val="3333FF"/>
-              </a:solidFill>
-              <a:latin typeface="Lucida Console" panose="020B0609040504020204" pitchFamily="49" charset="0"/>
-              <a:cs typeface="Courier New" pitchFamily="49" charset="0"/>
-            </a:endParaRPr>
+              <a:t>_table(“../</a:t>
+            </a:r>
+            <a:r>
+              <a:rPr lang="en-GB" altLang="en-US" sz="1400" dirty="0">
+                <a:solidFill>
+                  <a:srgbClr val="3333FF"/>
+                </a:solidFill>
+                <a:latin typeface="Lucida Console" panose="020B0609040504020204" pitchFamily="49" charset="0"/>
+                <a:cs typeface="Courier New" pitchFamily="49" charset="0"/>
+              </a:rPr>
+              <a:t>data/butterf.txt")</a:t>
+            </a:r>
           </a:p>
           <a:p>
             <a:pPr>
@@ -12838,13 +12814,6 @@
   <p:clrMapOvr>
     <a:masterClrMapping/>
   </p:clrMapOvr>
-  <p:timing>
-    <p:tnLst>
-      <p:par>
-        <p:cTn id="1" dur="indefinite" restart="never" nodeType="tmRoot"/>
-      </p:par>
-    </p:tnLst>
-  </p:timing>
 </p:sld>
 </file>
 
@@ -13212,13 +13181,6 @@
   <p:clrMapOvr>
     <a:masterClrMapping/>
   </p:clrMapOvr>
-  <p:timing>
-    <p:tnLst>
-      <p:par>
-        <p:cTn id="1" dur="indefinite" restart="never" nodeType="tmRoot"/>
-      </p:par>
-    </p:tnLst>
-  </p:timing>
 </p:sld>
 </file>
 
@@ -13314,7 +13276,7 @@
               <a:rPr lang="en-GB" altLang="en-US" sz="2400" dirty="0"/>
             </a:br>
             <a:r>
-              <a:rPr lang="en-GB" altLang="en-US" dirty="0" err="1" smtClean="0"/>
+              <a:rPr lang="en-GB" altLang="en-US" dirty="0" err="1"/>
               <a:t>Example</a:t>
             </a:r>
             <a:endParaRPr lang="en-GB" altLang="en-US" dirty="0"/>
@@ -14285,13 +14247,6 @@
   <p:clrMapOvr>
     <a:masterClrMapping/>
   </p:clrMapOvr>
-  <p:timing>
-    <p:tnLst>
-      <p:par>
-        <p:cTn id="1" dur="indefinite" restart="never" nodeType="tmRoot"/>
-      </p:par>
-    </p:tnLst>
-  </p:timing>
 </p:sld>
 </file>
 
@@ -14446,13 +14401,8 @@
           <a:p>
             <a:r>
               <a:rPr lang="en-GB" altLang="en-US" sz="2800" dirty="0"/>
-              <a:t>Run the </a:t>
-            </a:r>
-            <a:r>
-              <a:rPr lang="en-GB" altLang="en-US" sz="2800" dirty="0" smtClean="0"/>
-              <a:t>ANOVA</a:t>
-            </a:r>
-            <a:endParaRPr lang="en-GB" altLang="en-US" sz="2800" dirty="0"/>
+              <a:t>Run the ANOVA</a:t>
+            </a:r>
           </a:p>
         </p:txBody>
       </p:sp>
@@ -14578,7 +14528,7 @@
               <a:rPr lang="en-GB" altLang="en-US" sz="2400" dirty="0"/>
             </a:br>
             <a:r>
-              <a:rPr lang="en-GB" altLang="en-US" dirty="0" err="1" smtClean="0"/>
+              <a:rPr lang="en-GB" altLang="en-US" dirty="0" err="1"/>
               <a:t>Example</a:t>
             </a:r>
             <a:endParaRPr lang="en-GB" altLang="en-US" dirty="0"/>
@@ -14632,13 +14582,6 @@
   <p:clrMapOvr>
     <a:masterClrMapping/>
   </p:clrMapOvr>
-  <p:timing>
-    <p:tnLst>
-      <p:par>
-        <p:cTn id="1" dur="indefinite" restart="never" nodeType="tmRoot"/>
-      </p:par>
-    </p:tnLst>
-  </p:timing>
 </p:sld>
 </file>
 
@@ -14938,7 +14881,7 @@
               <a:rPr lang="en-GB" altLang="en-US" sz="2400" dirty="0"/>
             </a:br>
             <a:r>
-              <a:rPr lang="en-GB" altLang="en-US" dirty="0" err="1" smtClean="0"/>
+              <a:rPr lang="en-GB" altLang="en-US" dirty="0" err="1"/>
               <a:t>Example</a:t>
             </a:r>
             <a:endParaRPr lang="en-GB" altLang="en-US" dirty="0"/>
@@ -14955,13 +14898,6 @@
   <p:clrMapOvr>
     <a:masterClrMapping/>
   </p:clrMapOvr>
-  <p:timing>
-    <p:tnLst>
-      <p:par>
-        <p:cTn id="1" dur="indefinite" restart="never" nodeType="tmRoot"/>
-      </p:par>
-    </p:tnLst>
-  </p:timing>
 </p:sld>
 </file>
 
@@ -14998,10 +14934,9 @@
           <a:lstStyle/>
           <a:p>
             <a:r>
-              <a:rPr lang="en-GB" dirty="0" smtClean="0"/>
+              <a:rPr lang="en-GB" dirty="0"/>
               <a:t>Last week</a:t>
             </a:r>
-            <a:endParaRPr lang="en-GB" dirty="0"/>
           </a:p>
         </p:txBody>
       </p:sp>
@@ -15023,103 +14958,92 @@
           <a:lstStyle/>
           <a:p>
             <a:r>
-              <a:rPr lang="en-GB" dirty="0" smtClean="0"/>
-              <a:t>Extended our ability to test for differences between two or more groups with the one-way ANOVA and its non-parametric </a:t>
-            </a:r>
-            <a:r>
               <a:rPr lang="en-GB" dirty="0"/>
-              <a:t>equivalent </a:t>
-            </a:r>
-            <a:r>
-              <a:rPr lang="en-GB" dirty="0" err="1" smtClean="0"/>
+              <a:t>Extended our ability to test for differences between two or more groups with the one-way ANOVA and its non-parametric equivalent </a:t>
+            </a:r>
+            <a:r>
+              <a:rPr lang="en-GB" dirty="0" err="1"/>
               <a:t>Kruskal</a:t>
             </a:r>
             <a:r>
-              <a:rPr lang="en-GB" dirty="0" smtClean="0"/>
+              <a:rPr lang="en-GB" dirty="0"/>
               <a:t>-Wallis</a:t>
             </a:r>
           </a:p>
           <a:p>
             <a:pPr lvl="1"/>
             <a:r>
-              <a:rPr lang="en-GB" dirty="0" smtClean="0"/>
+              <a:rPr lang="en-GB" dirty="0"/>
               <a:t>Rationale for ANOVA rather than multiple </a:t>
             </a:r>
             <a:r>
-              <a:rPr lang="en-GB" i="1" dirty="0" smtClean="0"/>
+              <a:rPr lang="en-GB" i="1" dirty="0"/>
               <a:t>t</a:t>
             </a:r>
             <a:r>
-              <a:rPr lang="en-GB" dirty="0" smtClean="0"/>
+              <a:rPr lang="en-GB" dirty="0"/>
               <a:t>-tests</a:t>
             </a:r>
-            <a:endParaRPr lang="en-GB" dirty="0"/>
           </a:p>
           <a:p>
             <a:pPr lvl="1"/>
             <a:r>
-              <a:rPr lang="en-GB" dirty="0" smtClean="0"/>
+              <a:rPr lang="en-GB" dirty="0"/>
               <a:t>ANOVA terminology and concepts: SS, MS, </a:t>
             </a:r>
             <a:r>
-              <a:rPr lang="en-GB" i="1" dirty="0" smtClean="0"/>
+              <a:rPr lang="en-GB" i="1" dirty="0"/>
               <a:t>F</a:t>
             </a:r>
           </a:p>
           <a:p>
             <a:pPr lvl="1"/>
             <a:r>
-              <a:rPr lang="en-GB" dirty="0" smtClean="0"/>
+              <a:rPr lang="en-GB" dirty="0"/>
               <a:t>Post-hoc tests</a:t>
             </a:r>
           </a:p>
           <a:p>
             <a:r>
-              <a:rPr lang="en-GB" dirty="0" smtClean="0"/>
-              <a:t>In </a:t>
-            </a:r>
-            <a:r>
               <a:rPr lang="en-GB" dirty="0"/>
-              <a:t>RStudio </a:t>
+              <a:t>In RStudio </a:t>
             </a:r>
           </a:p>
           <a:p>
             <a:pPr lvl="1"/>
             <a:r>
-              <a:rPr lang="en-GB" dirty="0" smtClean="0"/>
+              <a:rPr lang="en-GB" dirty="0"/>
               <a:t>Importing data from csv files</a:t>
             </a:r>
           </a:p>
           <a:p>
             <a:pPr lvl="1"/>
             <a:r>
-              <a:rPr lang="en-GB" dirty="0" smtClean="0"/>
+              <a:rPr lang="en-GB" dirty="0"/>
               <a:t>One way ANOVA and </a:t>
             </a:r>
             <a:r>
-              <a:rPr lang="en-GB" dirty="0" err="1" smtClean="0"/>
+              <a:rPr lang="en-GB" dirty="0" err="1"/>
               <a:t>Kruskal</a:t>
             </a:r>
             <a:r>
-              <a:rPr lang="en-GB" dirty="0" smtClean="0"/>
+              <a:rPr lang="en-GB" dirty="0"/>
               <a:t>-Wallis and their post-hoc tests</a:t>
             </a:r>
-            <a:endParaRPr lang="en-GB" dirty="0"/>
           </a:p>
           <a:p>
             <a:pPr lvl="1"/>
             <a:r>
-              <a:rPr lang="en-GB" dirty="0" smtClean="0"/>
+              <a:rPr lang="en-GB" dirty="0"/>
               <a:t>Summarising and reporting</a:t>
             </a:r>
           </a:p>
           <a:p>
             <a:pPr lvl="1"/>
             <a:r>
-              <a:rPr lang="en-GB" dirty="0" smtClean="0"/>
+              <a:rPr lang="en-GB" dirty="0"/>
               <a:t>Figure annotations</a:t>
             </a:r>
-            <a:endParaRPr lang="en-GB" dirty="0"/>
           </a:p>
           <a:p>
             <a:endParaRPr lang="en-GB" dirty="0"/>
@@ -15163,13 +15087,6 @@
   <p:clrMapOvr>
     <a:masterClrMapping/>
   </p:clrMapOvr>
-  <p:timing>
-    <p:tnLst>
-      <p:par>
-        <p:cTn id="1" dur="indefinite" restart="never" nodeType="tmRoot"/>
-      </p:par>
-    </p:tnLst>
-  </p:timing>
 </p:sld>
 </file>
 
@@ -15485,7 +15402,7 @@
               <a:defRPr/>
             </a:pPr>
             <a:r>
-              <a:rPr lang="en-GB" sz="1600" kern="0" dirty="0" smtClean="0">
+              <a:rPr lang="en-GB" sz="1600" kern="0" dirty="0">
                 <a:solidFill>
                   <a:srgbClr val="000000"/>
                 </a:solidFill>
@@ -15507,7 +15424,7 @@
               <a:defRPr/>
             </a:pPr>
             <a:r>
-              <a:rPr lang="en-GB" sz="1600" kern="0" dirty="0" err="1" smtClean="0">
+              <a:rPr lang="en-GB" sz="1600" kern="0" dirty="0" err="1">
                 <a:solidFill>
                   <a:srgbClr val="000000"/>
                 </a:solidFill>
@@ -15517,7 +15434,7 @@
               <a:t>Signif</a:t>
             </a:r>
             <a:r>
-              <a:rPr lang="en-GB" sz="1600" kern="0" dirty="0" smtClean="0">
+              <a:rPr lang="en-GB" sz="1600" kern="0" dirty="0">
                 <a:solidFill>
                   <a:srgbClr val="000000"/>
                 </a:solidFill>
@@ -15526,13 +15443,6 @@
               </a:rPr>
               <a:t>. codes:  0 ‘***’ 0.001 ‘**’ 0.01 ‘*’ 0.05 ‘.’ 0.1 ‘ ’ 1</a:t>
             </a:r>
-            <a:endParaRPr lang="en-GB" sz="1600" kern="0" dirty="0">
-              <a:solidFill>
-                <a:srgbClr val="000000"/>
-              </a:solidFill>
-              <a:latin typeface="Lucida Console" panose="020B0609040504020204" pitchFamily="49" charset="0"/>
-              <a:cs typeface="Courier New" pitchFamily="49" charset="0"/>
-            </a:endParaRPr>
           </a:p>
         </p:txBody>
       </p:sp>
@@ -15647,16 +15557,15 @@
           <a:lstStyle/>
           <a:p>
             <a:r>
-              <a:rPr lang="en-GB" altLang="en-US" sz="2800" dirty="0" smtClean="0"/>
+              <a:rPr lang="en-GB" altLang="en-US" sz="2800" dirty="0"/>
               <a:t>Three tests</a:t>
             </a:r>
           </a:p>
           <a:p>
             <a:r>
-              <a:rPr lang="en-GB" altLang="en-US" sz="2800" dirty="0" smtClean="0"/>
+              <a:rPr lang="en-GB" altLang="en-US" sz="2800" dirty="0"/>
               <a:t>Three p values</a:t>
             </a:r>
-            <a:endParaRPr lang="en-GB" altLang="en-US" sz="2800" dirty="0"/>
           </a:p>
         </p:txBody>
       </p:sp>
@@ -15670,13 +15579,6 @@
   <p:clrMapOvr>
     <a:masterClrMapping/>
   </p:clrMapOvr>
-  <p:timing>
-    <p:tnLst>
-      <p:par>
-        <p:cTn id="1" dur="indefinite" restart="never" nodeType="tmRoot"/>
-      </p:par>
-    </p:tnLst>
-  </p:timing>
 </p:sld>
 </file>
 
@@ -16217,13 +16119,6 @@
   <p:clrMapOvr>
     <a:masterClrMapping/>
   </p:clrMapOvr>
-  <p:timing>
-    <p:tnLst>
-      <p:par>
-        <p:cTn id="1" dur="indefinite" restart="never" nodeType="tmRoot"/>
-      </p:par>
-    </p:tnLst>
-  </p:timing>
 </p:sld>
 </file>
 
@@ -17042,13 +16937,6 @@
   <p:clrMapOvr>
     <a:masterClrMapping/>
   </p:clrMapOvr>
-  <p:timing>
-    <p:tnLst>
-      <p:par>
-        <p:cTn id="1" dur="indefinite" restart="never" nodeType="tmRoot"/>
-      </p:par>
-    </p:tnLst>
-  </p:timing>
 </p:sld>
 </file>
 
@@ -17626,13 +17514,6 @@
   <p:clrMapOvr>
     <a:masterClrMapping/>
   </p:clrMapOvr>
-  <p:timing>
-    <p:tnLst>
-      <p:par>
-        <p:cTn id="1" dur="indefinite" restart="never" nodeType="tmRoot"/>
-      </p:par>
-    </p:tnLst>
-  </p:timing>
 </p:sld>
 </file>
 
@@ -17677,10 +17558,6 @@
               <a:rPr lang="en-GB" altLang="en-US" sz="2800" dirty="0"/>
               <a:t>Two-way ANOVA example</a:t>
             </a:r>
-            <a:r>
-              <a:rPr lang="en-GB" altLang="en-US" dirty="0"/>
-              <a:t/>
-            </a:r>
             <a:br>
               <a:rPr lang="en-GB" altLang="en-US" dirty="0"/>
             </a:br>
@@ -17801,13 +17678,6 @@
   <p:clrMapOvr>
     <a:masterClrMapping/>
   </p:clrMapOvr>
-  <p:timing>
-    <p:tnLst>
-      <p:par>
-        <p:cTn id="1" dur="indefinite" restart="never" nodeType="tmRoot"/>
-      </p:par>
-    </p:tnLst>
-  </p:timing>
 </p:sld>
 </file>
 
@@ -18468,10 +18338,6 @@
             <a:r>
               <a:rPr lang="en-GB" altLang="en-US" sz="2800" dirty="0"/>
               <a:t>Two-way ANOVA</a:t>
-            </a:r>
-            <a:r>
-              <a:rPr lang="en-GB" altLang="en-US" dirty="0"/>
-              <a:t/>
             </a:r>
             <a:br>
               <a:rPr lang="en-GB" altLang="en-US" dirty="0"/>
@@ -19133,13 +18999,6 @@
   <p:clrMapOvr>
     <a:masterClrMapping/>
   </p:clrMapOvr>
-  <p:timing>
-    <p:tnLst>
-      <p:par>
-        <p:cTn id="1" dur="indefinite" restart="never" nodeType="tmRoot"/>
-      </p:par>
-    </p:tnLst>
-  </p:timing>
 </p:sld>
 </file>
 
@@ -20887,13 +20746,6 @@
   <p:clrMapOvr>
     <a:masterClrMapping/>
   </p:clrMapOvr>
-  <p:timing>
-    <p:tnLst>
-      <p:par>
-        <p:cTn id="1" dur="indefinite" restart="never" nodeType="tmRoot"/>
-      </p:par>
-    </p:tnLst>
-  </p:timing>
 </p:sld>
 </file>
 
@@ -21795,13 +21647,6 @@
   <p:clrMapOvr>
     <a:masterClrMapping/>
   </p:clrMapOvr>
-  <p:timing>
-    <p:tnLst>
-      <p:par>
-        <p:cTn id="1" dur="indefinite" restart="never" nodeType="tmRoot"/>
-      </p:par>
-    </p:tnLst>
-  </p:timing>
 </p:sld>
 </file>
 
@@ -21865,24 +21710,20 @@
               <a:buNone/>
             </a:pPr>
             <a:r>
-              <a:rPr lang="en-GB" dirty="0" smtClean="0"/>
+              <a:rPr lang="en-GB" dirty="0"/>
               <a:t>Extend of our understanding to testing with two explanatory variables using the two-way ANOVA</a:t>
             </a:r>
           </a:p>
           <a:p>
             <a:r>
-              <a:rPr lang="en-GB" dirty="0" smtClean="0"/>
+              <a:rPr lang="en-GB" dirty="0"/>
               <a:t>Comparison with one-way ANOVA</a:t>
             </a:r>
           </a:p>
           <a:p>
             <a:r>
-              <a:rPr lang="en-GB" dirty="0" smtClean="0"/>
-              <a:t>The three </a:t>
-            </a:r>
-            <a:r>
               <a:rPr lang="en-GB" dirty="0"/>
-              <a:t>null hypotheses</a:t>
+              <a:t>The three null hypotheses</a:t>
             </a:r>
           </a:p>
           <a:p>
@@ -21893,44 +21734,20 @@
           </a:p>
           <a:p>
             <a:r>
-              <a:rPr lang="en-GB" dirty="0" smtClean="0"/>
-              <a:t>Investigating </a:t>
-            </a:r>
-            <a:r>
               <a:rPr lang="en-GB" dirty="0"/>
-              <a:t>the assumptions</a:t>
-            </a:r>
-          </a:p>
-          <a:p>
-            <a:r>
-              <a:rPr lang="en-GB" dirty="0" smtClean="0"/>
-              <a:t>Understanding </a:t>
-            </a:r>
+              <a:t>Investigating the assumptions</a:t>
+            </a:r>
+          </a:p>
+          <a:p>
             <a:r>
               <a:rPr lang="en-GB" dirty="0"/>
-              <a:t>the </a:t>
-            </a:r>
-            <a:r>
-              <a:rPr lang="en-GB" dirty="0" smtClean="0"/>
-              <a:t>interaction</a:t>
-            </a:r>
-          </a:p>
-          <a:p>
-            <a:r>
-              <a:rPr lang="en-GB" dirty="0" smtClean="0"/>
-              <a:t>Post-hoc analysis (</a:t>
-            </a:r>
+              <a:t>Understanding the interaction</a:t>
+            </a:r>
+          </a:p>
+          <a:p>
             <a:r>
               <a:rPr lang="en-GB" dirty="0"/>
-              <a:t>after a significant </a:t>
-            </a:r>
-            <a:r>
-              <a:rPr lang="en-GB" dirty="0" smtClean="0"/>
-              <a:t>two-way ANOVA</a:t>
-            </a:r>
-            <a:r>
-              <a:rPr lang="en-GB" dirty="0"/>
-              <a:t>)</a:t>
+              <a:t>Post-hoc analysis (after a significant two-way ANOVA)</a:t>
             </a:r>
           </a:p>
           <a:p>
@@ -21972,13 +21789,6 @@
   <p:clrMapOvr>
     <a:masterClrMapping/>
   </p:clrMapOvr>
-  <p:timing>
-    <p:tnLst>
-      <p:par>
-        <p:cTn id="1" dur="indefinite" restart="never" nodeType="tmRoot"/>
-      </p:par>
-    </p:tnLst>
-  </p:timing>
 </p:sld>
 </file>
 
@@ -22957,13 +22767,6 @@
   <p:clrMapOvr>
     <a:masterClrMapping/>
   </p:clrMapOvr>
-  <p:timing>
-    <p:tnLst>
-      <p:par>
-        <p:cTn id="1" dur="indefinite" restart="never" nodeType="tmRoot"/>
-      </p:par>
-    </p:tnLst>
-  </p:timing>
 </p:sld>
 </file>
 
@@ -23018,15 +22821,7 @@
             </a:r>
             <a:r>
               <a:rPr lang="en-US" altLang="en-US" sz="2000" dirty="0"/>
-              <a:t> had significantly longer </a:t>
-            </a:r>
-            <a:r>
-              <a:rPr lang="en-US" altLang="en-US" sz="2000" dirty="0" smtClean="0"/>
-              <a:t>wings on average </a:t>
-            </a:r>
-            <a:r>
-              <a:rPr lang="en-US" altLang="en-US" sz="2000" dirty="0"/>
-              <a:t>than </a:t>
+              <a:t> had significantly longer wings on average than </a:t>
             </a:r>
             <a:r>
               <a:rPr lang="en-US" altLang="en-US" sz="2000" i="1" dirty="0" err="1"/>
@@ -23086,11 +22881,7 @@
             </a:r>
             <a:r>
               <a:rPr lang="en-US" altLang="en-US" sz="2000" dirty="0"/>
-              <a:t> = 0.004). However, </a:t>
-            </a:r>
-            <a:r>
-              <a:rPr lang="en-US" altLang="en-US" sz="2000" dirty="0" smtClean="0"/>
-              <a:t>this was primarily because northern </a:t>
+              <a:t> = 0.004). However, this was primarily because northern </a:t>
             </a:r>
             <a:r>
               <a:rPr lang="en-US" altLang="en-US" sz="2000" i="1" dirty="0" err="1"/>
@@ -23098,19 +22889,7 @@
             </a:r>
             <a:r>
               <a:rPr lang="en-US" altLang="en-US" sz="2000" dirty="0"/>
-              <a:t> </a:t>
-            </a:r>
-            <a:r>
-              <a:rPr lang="en-US" altLang="en-US" sz="2000" dirty="0" smtClean="0"/>
-              <a:t>were significantly larger than the other three groups (</a:t>
-            </a:r>
-            <a:r>
-              <a:rPr lang="en-US" altLang="en-US" sz="2000" dirty="0"/>
-              <a:t>Tukey Honest Significant difference: </a:t>
-            </a:r>
-            <a:r>
-              <a:rPr lang="en-US" altLang="en-US" sz="2000" dirty="0" smtClean="0"/>
-              <a:t>southern </a:t>
+              <a:t> were significantly larger than the other three groups (Tukey Honest Significant difference: southern </a:t>
             </a:r>
             <a:r>
               <a:rPr lang="en-US" altLang="en-US" sz="2000" i="1" dirty="0" err="1"/>
@@ -23121,51 +22900,19 @@
               <a:t> </a:t>
             </a:r>
             <a:r>
-              <a:rPr lang="en-US" altLang="en-US" sz="2000" i="1" dirty="0" smtClean="0"/>
-              <a:t>p</a:t>
-            </a:r>
-            <a:r>
-              <a:rPr lang="en-US" altLang="en-US" sz="2000" dirty="0" smtClean="0"/>
-              <a:t> </a:t>
-            </a:r>
-            <a:r>
-              <a:rPr lang="en-US" altLang="en-US" sz="2000" dirty="0"/>
-              <a:t>= </a:t>
-            </a:r>
-            <a:r>
-              <a:rPr lang="en-US" altLang="en-US" sz="2000" dirty="0" smtClean="0"/>
-              <a:t>0.0048, </a:t>
-            </a:r>
-            <a:r>
-              <a:rPr lang="en-US" altLang="en-US" sz="2000" dirty="0"/>
-              <a:t>southern </a:t>
-            </a:r>
-            <a:r>
-              <a:rPr lang="en-US" altLang="en-US" sz="2000" i="1" dirty="0" err="1" smtClean="0"/>
-              <a:t>F.flappa</a:t>
-            </a:r>
-            <a:r>
-              <a:rPr lang="en-US" altLang="en-US" sz="2000" dirty="0" smtClean="0"/>
-              <a:t> </a:t>
-            </a:r>
-            <a:r>
               <a:rPr lang="en-US" altLang="en-US" sz="2000" i="1" dirty="0"/>
               <a:t>p</a:t>
             </a:r>
             <a:r>
               <a:rPr lang="en-US" altLang="en-US" sz="2000" dirty="0"/>
-              <a:t> = </a:t>
-            </a:r>
-            <a:r>
-              <a:rPr lang="en-US" altLang="en-US" sz="2000" dirty="0" smtClean="0"/>
-              <a:t>0.0004, northern </a:t>
-            </a:r>
-            <a:r>
-              <a:rPr lang="en-US" altLang="en-US" sz="2000" i="1" dirty="0" err="1" smtClean="0"/>
+              <a:t> = 0.0048, southern </a:t>
+            </a:r>
+            <a:r>
+              <a:rPr lang="en-US" altLang="en-US" sz="2000" i="1" dirty="0" err="1"/>
               <a:t>F.flappa</a:t>
             </a:r>
             <a:r>
-              <a:rPr lang="en-US" altLang="en-US" sz="2000" dirty="0" smtClean="0"/>
+              <a:rPr lang="en-US" altLang="en-US" sz="2000" dirty="0"/>
               <a:t> </a:t>
             </a:r>
             <a:r>
@@ -23174,11 +22921,23 @@
             </a:r>
             <a:r>
               <a:rPr lang="en-US" altLang="en-US" sz="2000" dirty="0"/>
-              <a:t> = </a:t>
-            </a:r>
-            <a:r>
-              <a:rPr lang="en-US" altLang="en-US" sz="2000" dirty="0" smtClean="0"/>
-              <a:t>0.003, ). See Figure 1.</a:t>
+              <a:t> = 0.0004, northern </a:t>
+            </a:r>
+            <a:r>
+              <a:rPr lang="en-US" altLang="en-US" sz="2000" i="1" dirty="0" err="1"/>
+              <a:t>F.flappa</a:t>
+            </a:r>
+            <a:r>
+              <a:rPr lang="en-US" altLang="en-US" sz="2000" dirty="0"/>
+              <a:t> </a:t>
+            </a:r>
+            <a:r>
+              <a:rPr lang="en-US" altLang="en-US" sz="2000" i="1" dirty="0"/>
+              <a:t>p</a:t>
+            </a:r>
+            <a:r>
+              <a:rPr lang="en-US" altLang="en-US" sz="2000" dirty="0"/>
+              <a:t> = 0.003, ). See Figure 1.</a:t>
             </a:r>
             <a:endParaRPr lang="en-GB" altLang="en-US" sz="2000" dirty="0"/>
           </a:p>
@@ -23281,13 +23040,6 @@
   <p:clrMapOvr>
     <a:masterClrMapping/>
   </p:clrMapOvr>
-  <p:timing>
-    <p:tnLst>
-      <p:par>
-        <p:cTn id="1" dur="indefinite" restart="never" nodeType="tmRoot"/>
-      </p:par>
-    </p:tnLst>
-  </p:timing>
 </p:sld>
 </file>
 
@@ -23434,13 +23186,6 @@
   <p:clrMapOvr>
     <a:masterClrMapping/>
   </p:clrMapOvr>
-  <p:timing>
-    <p:tnLst>
-      <p:par>
-        <p:cTn id="1" dur="indefinite" restart="never" nodeType="tmRoot"/>
-      </p:par>
-    </p:tnLst>
-  </p:timing>
 </p:sld>
 </file>
 
@@ -23529,10 +23274,9 @@
           </a:lstStyle>
           <a:p>
             <a:r>
-              <a:rPr lang="en-GB" altLang="en-US" dirty="0" smtClean="0"/>
+              <a:rPr lang="en-GB" altLang="en-US" dirty="0"/>
               <a:t>Two-way ANOVA summary</a:t>
             </a:r>
-            <a:endParaRPr lang="en-GB" altLang="en-US" dirty="0"/>
           </a:p>
         </p:txBody>
       </p:sp>
@@ -23574,7 +23318,7 @@
               <a:defRPr/>
             </a:pPr>
             <a:r>
-              <a:rPr lang="en-GB" sz="2800" kern="0" dirty="0" smtClean="0"/>
+              <a:rPr lang="en-GB" sz="2800" kern="0" dirty="0"/>
               <a:t>Parametric</a:t>
             </a:r>
           </a:p>
@@ -23589,7 +23333,7 @@
               <a:defRPr/>
             </a:pPr>
             <a:r>
-              <a:rPr lang="en-GB" sz="2800" kern="0" dirty="0" smtClean="0"/>
+              <a:rPr lang="en-GB" sz="2800" kern="0" dirty="0"/>
               <a:t>Two explanatory categorical variables</a:t>
             </a:r>
           </a:p>
@@ -23604,10 +23348,9 @@
               <a:defRPr/>
             </a:pPr>
             <a:r>
-              <a:rPr lang="en-GB" sz="2800" kern="0" dirty="0" smtClean="0"/>
+              <a:rPr lang="en-GB" sz="2800" kern="0" dirty="0"/>
               <a:t>Three null hypotheses: main effects and interaction</a:t>
             </a:r>
-            <a:endParaRPr lang="en-GB" sz="2800" kern="0" dirty="0"/>
           </a:p>
           <a:p>
             <a:pPr marL="457200" indent="-457200">
@@ -23615,7 +23358,7 @@
               <a:buChar char="•"/>
             </a:pPr>
             <a:r>
-              <a:rPr lang="en-GB" sz="2800" kern="0" dirty="0" smtClean="0"/>
+              <a:rPr lang="en-GB" sz="2800" kern="0" dirty="0"/>
               <a:t>Function in R:</a:t>
             </a:r>
           </a:p>
@@ -23625,40 +23368,28 @@
               <a:rPr lang="it-IT" sz="2000" kern="0" dirty="0">
                 <a:latin typeface="Lucida Console" panose="020B0609040504020204" pitchFamily="49" charset="0"/>
               </a:rPr>
-              <a:t>m</a:t>
-            </a:r>
-            <a:r>
-              <a:rPr lang="it-IT" sz="2000" kern="0" dirty="0" smtClean="0">
-                <a:latin typeface="Lucida Console" panose="020B0609040504020204" pitchFamily="49" charset="0"/>
-              </a:rPr>
-              <a:t>od &lt;- aov(data </a:t>
+              <a:t>mod &lt;- aov(data = </a:t>
+            </a:r>
+            <a:r>
+              <a:rPr lang="it-IT" sz="2000" i="1" kern="0" dirty="0">
+                <a:latin typeface="Lucida Console" panose="020B0609040504020204" pitchFamily="49" charset="0"/>
+              </a:rPr>
+              <a:t>df</a:t>
             </a:r>
             <a:r>
               <a:rPr lang="it-IT" sz="2000" kern="0" dirty="0">
                 <a:latin typeface="Lucida Console" panose="020B0609040504020204" pitchFamily="49" charset="0"/>
               </a:rPr>
-              <a:t>= </a:t>
-            </a:r>
-            <a:r>
-              <a:rPr lang="it-IT" sz="2000" i="1" kern="0" dirty="0" smtClean="0">
-                <a:latin typeface="Lucida Console" panose="020B0609040504020204" pitchFamily="49" charset="0"/>
-              </a:rPr>
-              <a:t>df</a:t>
-            </a:r>
-            <a:r>
-              <a:rPr lang="it-IT" sz="2000" kern="0" dirty="0" smtClean="0">
-                <a:latin typeface="Lucida Console" panose="020B0609040504020204" pitchFamily="49" charset="0"/>
-              </a:rPr>
               <a:t>, </a:t>
             </a:r>
             <a:r>
-              <a:rPr lang="it-IT" sz="2000" i="1" kern="0" dirty="0" smtClean="0">
+              <a:rPr lang="it-IT" sz="2000" i="1" kern="0" dirty="0">
                 <a:latin typeface="Lucida Console" panose="020B0609040504020204" pitchFamily="49" charset="0"/>
               </a:rPr>
               <a:t>response ~ explanatory1 * explanatory2</a:t>
             </a:r>
             <a:r>
-              <a:rPr lang="it-IT" sz="2000" kern="0" dirty="0" smtClean="0">
+              <a:rPr lang="it-IT" sz="2000" kern="0" dirty="0">
                 <a:latin typeface="Lucida Console" panose="020B0609040504020204" pitchFamily="49" charset="0"/>
               </a:rPr>
               <a:t>)</a:t>
@@ -23667,14 +23398,11 @@
           <a:p>
             <a:pPr lvl="1"/>
             <a:r>
-              <a:rPr lang="it-IT" sz="2000" kern="0" dirty="0" smtClean="0">
+              <a:rPr lang="it-IT" sz="2000" kern="0" dirty="0">
                 <a:latin typeface="Lucida Console" panose="020B0609040504020204" pitchFamily="49" charset="0"/>
               </a:rPr>
               <a:t>summary(mod)</a:t>
             </a:r>
-            <a:endParaRPr lang="it-IT" sz="2000" kern="0" dirty="0">
-              <a:latin typeface="Lucida Console" panose="020B0609040504020204" pitchFamily="49" charset="0"/>
-            </a:endParaRPr>
           </a:p>
           <a:p>
             <a:pPr marL="457200" indent="-457200">
@@ -23682,24 +23410,16 @@
               <a:buChar char="•"/>
             </a:pPr>
             <a:r>
-              <a:rPr lang="en-US" sz="2800" kern="0" dirty="0" smtClean="0"/>
-              <a:t>assumptions</a:t>
-            </a:r>
-            <a:r>
               <a:rPr lang="en-US" sz="2800" kern="0" dirty="0"/>
-              <a:t>: normally and homogenously distributed </a:t>
-            </a:r>
-            <a:r>
-              <a:rPr lang="en-US" sz="2800" kern="0" dirty="0" smtClean="0"/>
-              <a:t>residuals</a:t>
-            </a:r>
-          </a:p>
-          <a:p>
-            <a:endParaRPr lang="en-GB" sz="2800" kern="0" dirty="0" smtClean="0"/>
-          </a:p>
-          <a:p>
-            <a:r>
-              <a:rPr lang="en-GB" sz="2800" kern="0" dirty="0" smtClean="0"/>
+              <a:t>assumptions: normally and homogenously distributed residuals</a:t>
+            </a:r>
+          </a:p>
+          <a:p>
+            <a:endParaRPr lang="en-GB" sz="2800" kern="0" dirty="0"/>
+          </a:p>
+          <a:p>
+            <a:r>
+              <a:rPr lang="en-GB" sz="2800" kern="0" dirty="0"/>
               <a:t>continued</a:t>
             </a:r>
           </a:p>
@@ -23709,7 +23429,7 @@
               <a:buNone/>
             </a:pPr>
             <a:r>
-              <a:rPr lang="en-GB" sz="2800" kern="0" dirty="0" smtClean="0"/>
+              <a:rPr lang="en-GB" sz="2800" kern="0" dirty="0"/>
               <a:t> </a:t>
             </a:r>
             <a:endParaRPr lang="it-IT" altLang="en-US" sz="2800" dirty="0">
@@ -23732,13 +23452,6 @@
   <p:clrMapOvr>
     <a:masterClrMapping/>
   </p:clrMapOvr>
-  <p:timing>
-    <p:tnLst>
-      <p:par>
-        <p:cTn id="1" dur="indefinite" restart="never" nodeType="tmRoot"/>
-      </p:par>
-    </p:tnLst>
-  </p:timing>
 </p:sld>
 </file>
 
@@ -23834,18 +23547,13 @@
               <a:rPr lang="en-GB" altLang="en-US" sz="2800" dirty="0"/>
               <a:t>-tests</a:t>
             </a:r>
-            <a:r>
-              <a:rPr lang="en-GB" altLang="en-US" dirty="0"/>
-              <a:t/>
-            </a:r>
             <a:br>
               <a:rPr lang="en-GB" altLang="en-US" dirty="0"/>
             </a:br>
             <a:r>
-              <a:rPr lang="en-GB" altLang="en-US" dirty="0" smtClean="0"/>
+              <a:rPr lang="en-GB" altLang="en-US" dirty="0"/>
               <a:t>Two-way ANOVA summary</a:t>
             </a:r>
-            <a:endParaRPr lang="en-GB" altLang="en-US" dirty="0"/>
           </a:p>
         </p:txBody>
       </p:sp>
@@ -23887,7 +23595,7 @@
               <a:defRPr/>
             </a:pPr>
             <a:r>
-              <a:rPr lang="en-GB" sz="2800" kern="0" dirty="0" smtClean="0"/>
+              <a:rPr lang="en-GB" sz="2800" kern="0" dirty="0"/>
               <a:t>ANOVA tells at lest two means differ and a post-hoc test is need to determine which means differ</a:t>
             </a:r>
           </a:p>
@@ -23902,7 +23610,7 @@
               <a:defRPr/>
             </a:pPr>
             <a:r>
-              <a:rPr lang="en-GB" sz="2800" kern="0" dirty="0" smtClean="0"/>
+              <a:rPr lang="en-GB" sz="2800" kern="0" dirty="0"/>
               <a:t>Tukey Honest Significant Difference is the post-hoc we used</a:t>
             </a:r>
           </a:p>
@@ -23931,7 +23639,7 @@
               <a:buChar char="•"/>
             </a:pPr>
             <a:r>
-              <a:rPr lang="en-US" sz="2800" kern="0" dirty="0" smtClean="0"/>
+              <a:rPr lang="en-US" sz="2800" kern="0" dirty="0"/>
               <a:t>Interpret the interaction</a:t>
             </a:r>
           </a:p>
@@ -23941,7 +23649,7 @@
               <a:buChar char="•"/>
             </a:pPr>
             <a:r>
-              <a:rPr lang="en-US" sz="2800" kern="0" dirty="0" smtClean="0"/>
+              <a:rPr lang="en-US" sz="2800" kern="0" dirty="0"/>
               <a:t>Significance, direction, magnitude</a:t>
             </a:r>
           </a:p>
@@ -23951,12 +23659,12 @@
               <a:buChar char="•"/>
             </a:pPr>
             <a:r>
-              <a:rPr lang="en-US" sz="2800" kern="0" dirty="0" smtClean="0"/>
+              <a:rPr lang="en-US" sz="2800" kern="0" dirty="0"/>
               <a:t>Figure: data and ‘model’</a:t>
             </a:r>
           </a:p>
           <a:p>
-            <a:endParaRPr lang="en-GB" sz="2800" kern="0" dirty="0" smtClean="0"/>
+            <a:endParaRPr lang="en-GB" sz="2800" kern="0" dirty="0"/>
           </a:p>
           <a:p>
             <a:pPr>
@@ -23964,7 +23672,7 @@
               <a:buNone/>
             </a:pPr>
             <a:r>
-              <a:rPr lang="en-GB" sz="2800" kern="0" dirty="0" smtClean="0"/>
+              <a:rPr lang="en-GB" sz="2800" kern="0" dirty="0"/>
               <a:t> </a:t>
             </a:r>
             <a:endParaRPr lang="it-IT" altLang="en-US" sz="2800" dirty="0">
@@ -23987,13 +23695,6 @@
   <p:clrMapOvr>
     <a:masterClrMapping/>
   </p:clrMapOvr>
-  <p:timing>
-    <p:tnLst>
-      <p:par>
-        <p:cTn id="1" dur="indefinite" restart="never" nodeType="tmRoot"/>
-      </p:par>
-    </p:tnLst>
-  </p:timing>
 </p:sld>
 </file>
 
@@ -24030,10 +23731,9 @@
           <a:lstStyle/>
           <a:p>
             <a:r>
-              <a:rPr lang="en-US" dirty="0" smtClean="0"/>
+              <a:rPr lang="en-US" dirty="0"/>
               <a:t>Understanding the interaction</a:t>
             </a:r>
-            <a:endParaRPr lang="en-US" dirty="0"/>
           </a:p>
         </p:txBody>
       </p:sp>
@@ -24093,13 +23793,6 @@
   <p:clrMapOvr>
     <a:masterClrMapping/>
   </p:clrMapOvr>
-  <p:timing>
-    <p:tnLst>
-      <p:par>
-        <p:cTn id="1" dur="indefinite" restart="never" nodeType="tmRoot"/>
-      </p:par>
-    </p:tnLst>
-  </p:timing>
 </p:sld>
 </file>
 
@@ -24662,13 +24355,6 @@
   <p:clrMapOvr>
     <a:masterClrMapping/>
   </p:clrMapOvr>
-  <p:timing>
-    <p:tnLst>
-      <p:par>
-        <p:cTn id="1" dur="indefinite" restart="never" nodeType="tmRoot"/>
-      </p:par>
-    </p:tnLst>
-  </p:timing>
 </p:sld>
 </file>
 
@@ -24930,31 +24616,7 @@
               <a:rPr lang="en-GB" altLang="en-US" sz="2400" dirty="0">
                 <a:latin typeface="Arial" pitchFamily="34" charset="0"/>
               </a:rPr>
-              <a:t>No interaction</a:t>
-            </a:r>
-            <a:r>
-              <a:rPr lang="en-GB" altLang="en-US" sz="2400" dirty="0" smtClean="0">
-                <a:latin typeface="Arial" pitchFamily="34" charset="0"/>
-              </a:rPr>
-              <a:t>: Gap </a:t>
-            </a:r>
-            <a:r>
-              <a:rPr lang="en-GB" altLang="en-US" sz="2400" dirty="0">
-                <a:latin typeface="Arial" pitchFamily="34" charset="0"/>
-              </a:rPr>
-              <a:t>the same        </a:t>
-            </a:r>
-            <a:r>
-              <a:rPr lang="en-GB" altLang="en-US" sz="2400" dirty="0" smtClean="0">
-                <a:latin typeface="Arial" pitchFamily="34" charset="0"/>
-              </a:rPr>
-              <a:t>Interaction</a:t>
-            </a:r>
-            <a:r>
-              <a:rPr lang="en-GB" altLang="en-US" sz="2400" dirty="0">
-                <a:latin typeface="Arial" pitchFamily="34" charset="0"/>
-              </a:rPr>
-              <a:t>: Gap the reversed</a:t>
+              <a:t>No interaction: Gap the same        Interaction: Gap the reversed</a:t>
             </a:r>
           </a:p>
           <a:p>
@@ -25128,13 +24790,6 @@
   <p:clrMapOvr>
     <a:masterClrMapping/>
   </p:clrMapOvr>
-  <p:timing>
-    <p:tnLst>
-      <p:par>
-        <p:cTn id="1" dur="indefinite" restart="never" nodeType="tmRoot"/>
-      </p:par>
-    </p:tnLst>
-  </p:timing>
 </p:sld>
 </file>
 
@@ -26034,13 +25689,6 @@
   <p:clrMapOvr>
     <a:masterClrMapping/>
   </p:clrMapOvr>
-  <p:timing>
-    <p:tnLst>
-      <p:par>
-        <p:cTn id="1" dur="indefinite" restart="never" nodeType="tmRoot"/>
-      </p:par>
-    </p:tnLst>
-  </p:timing>
 </p:sld>
 </file>
 
@@ -26198,13 +25846,6 @@
   <p:clrMapOvr>
     <a:masterClrMapping/>
   </p:clrMapOvr>
-  <p:timing>
-    <p:tnLst>
-      <p:par>
-        <p:cTn id="1" dur="indefinite" restart="never" nodeType="tmRoot"/>
-      </p:par>
-    </p:tnLst>
-  </p:timing>
 </p:sld>
 </file>
 
@@ -26241,10 +25882,9 @@
           <a:lstStyle/>
           <a:p>
             <a:r>
-              <a:rPr lang="en-US" dirty="0" smtClean="0"/>
+              <a:rPr lang="en-US" dirty="0"/>
               <a:t>Review and rationale</a:t>
             </a:r>
-            <a:endParaRPr lang="en-US" dirty="0"/>
           </a:p>
         </p:txBody>
       </p:sp>
@@ -26301,13 +25941,6 @@
   <p:clrMapOvr>
     <a:masterClrMapping/>
   </p:clrMapOvr>
-  <p:timing>
-    <p:tnLst>
-      <p:par>
-        <p:cTn id="1" dur="indefinite" restart="never" nodeType="tmRoot"/>
-      </p:par>
-    </p:tnLst>
-  </p:timing>
 </p:sld>
 </file>
 
@@ -26356,11 +25989,7 @@
             </a:r>
             <a:r>
               <a:rPr lang="en-GB" altLang="en-US" sz="5400" dirty="0"/>
-              <a:t> </a:t>
-            </a:r>
-            <a:r>
-              <a:rPr lang="en-GB" altLang="en-US" sz="5400" dirty="0" smtClean="0"/>
-              <a:t>tests: 3 steps</a:t>
+              <a:t> tests: 3 steps</a:t>
             </a:r>
             <a:endParaRPr lang="en-GB" altLang="en-US" sz="8800" dirty="0"/>
           </a:p>
@@ -26580,7 +26209,7 @@
               <a:defRPr/>
             </a:pPr>
             <a:r>
-              <a:rPr lang="en-GB" sz="2600" dirty="0" smtClean="0"/>
+              <a:rPr lang="en-GB" sz="2600" dirty="0"/>
               <a:t>Categories: </a:t>
             </a:r>
             <a:r>
@@ -26599,12 +26228,8 @@
               <a:defRPr/>
             </a:pPr>
             <a:r>
-              <a:rPr lang="en-GB" sz="2600" dirty="0" smtClean="0"/>
-              <a:t>Continuous: </a:t>
-            </a:r>
-            <a:r>
               <a:rPr lang="en-GB" sz="2600" dirty="0"/>
-              <a:t>Regression, correlation</a:t>
+              <a:t>Continuous: Regression, correlation</a:t>
             </a:r>
           </a:p>
           <a:p>
@@ -26626,11 +26251,7 @@
             </a:pPr>
             <a:r>
               <a:rPr lang="en-GB" sz="2600" dirty="0"/>
-              <a:t>Normally </a:t>
-            </a:r>
-            <a:r>
-              <a:rPr lang="en-GB" sz="2600" dirty="0" smtClean="0"/>
-              <a:t>distributed: </a:t>
+              <a:t>Normally distributed: </a:t>
             </a:r>
             <a:r>
               <a:rPr lang="en-GB" sz="2600" i="1" dirty="0"/>
@@ -26648,12 +26269,8 @@
               <a:defRPr/>
             </a:pPr>
             <a:r>
-              <a:rPr lang="en-GB" sz="2600" dirty="0" smtClean="0"/>
-              <a:t>Counts: </a:t>
-            </a:r>
-            <a:r>
               <a:rPr lang="en-GB" sz="2600" dirty="0"/>
-              <a:t>Chi-squared or stage 2 </a:t>
+              <a:t>Counts: Chi-squared or stage 2 </a:t>
             </a:r>
             <a:r>
               <a:rPr lang="en-GB" sz="2600" dirty="0">
@@ -26697,13 +26314,6 @@
   <p:clrMapOvr>
     <a:masterClrMapping/>
   </p:clrMapOvr>
-  <p:timing>
-    <p:tnLst>
-      <p:par>
-        <p:cTn id="1" dur="indefinite" restart="never" nodeType="tmRoot"/>
-      </p:par>
-    </p:tnLst>
-  </p:timing>
 </p:sld>
 </file>
 
@@ -26781,13 +26391,6 @@
   <p:clrMapOvr>
     <a:masterClrMapping/>
   </p:clrMapOvr>
-  <p:timing>
-    <p:tnLst>
-      <p:par>
-        <p:cTn id="1" dur="indefinite" restart="never" nodeType="tmRoot"/>
-      </p:par>
-    </p:tnLst>
-  </p:timing>
 </p:sld>
 </file>
 
@@ -27429,13 +27032,6 @@
   <p:clrMapOvr>
     <a:masterClrMapping/>
   </p:clrMapOvr>
-  <p:timing>
-    <p:tnLst>
-      <p:par>
-        <p:cTn id="1" dur="indefinite" restart="never" nodeType="tmRoot"/>
-      </p:par>
-    </p:tnLst>
-  </p:timing>
 </p:sld>
 </file>
 
@@ -27895,13 +27491,6 @@
   <p:clrMapOvr>
     <a:masterClrMapping/>
   </p:clrMapOvr>
-  <p:timing>
-    <p:tnLst>
-      <p:par>
-        <p:cTn id="1" dur="indefinite" restart="never" nodeType="tmRoot"/>
-      </p:par>
-    </p:tnLst>
-  </p:timing>
 </p:sld>
 </file>
 

</xml_diff>